<commit_message>
Done work on part 3
</commit_message>
<xml_diff>
--- a/aitcg100 - Physics.pptx
+++ b/aitcg100 - Physics.pptx
@@ -439,6 +439,102 @@
 </inkml:ink>
 </file>
 
+<file path=ppt/ink/ink17.xml><?xml version="1.0" encoding="utf-8"?>
+<inkml:ink xmlns:inkml="http://www.w3.org/2003/InkML">
+  <inkml:definitions>
+    <inkml:context xml:id="ctx0">
+      <inkml:inkSource xml:id="inkSrc0">
+        <inkml:traceFormat>
+          <inkml:channel name="X" type="integer" min="-2.14748E9" max="2.14748E9" units="cm"/>
+          <inkml:channel name="Y" type="integer" min="-2.14748E9" max="2.14748E9" units="cm"/>
+          <inkml:channel name="F" type="integer" max="32767" units="dev"/>
+          <inkml:channel name="OA" type="integer" max="360" units="deg"/>
+          <inkml:channel name="OE" type="integer" max="90" units="deg"/>
+        </inkml:traceFormat>
+        <inkml:channelProperties>
+          <inkml:channelProperty channel="X" name="resolution" value="1000" units="1/cm"/>
+          <inkml:channelProperty channel="Y" name="resolution" value="1000" units="1/cm"/>
+          <inkml:channelProperty channel="F" name="resolution" value="0" units="1/dev"/>
+          <inkml:channelProperty channel="OA" name="resolution" value="1000" units="1/deg"/>
+          <inkml:channelProperty channel="OE" name="resolution" value="1000" units="1/deg"/>
+        </inkml:channelProperties>
+      </inkml:inkSource>
+      <inkml:timestamp xml:id="ts0" timeString="2020-03-31T07:04:32.849"/>
+    </inkml:context>
+    <inkml:brush xml:id="br0">
+      <inkml:brushProperty name="width" value="0.05" units="cm"/>
+      <inkml:brushProperty name="height" value="0.05" units="cm"/>
+      <inkml:brushProperty name="color" value="#333333"/>
+    </inkml:brush>
+  </inkml:definitions>
+  <inkml:trace contextRef="#ctx0" brushRef="#br0">64 51 11520 0 0,'0'0'512'0'0,"0"0"96"0"0,-17-17-480 0 0,7 1-128 0 0,10 16 0 0 0,-17-17 0 0 0,17 17-64 0 0,0 0-40 0 0,0 0-8 0 0,0 0 0 0 0,0 0 112 0 0,0 0 0 0 0,-20 0 0 0 0,20 0-72 0 0,0 0-176 0 0,0 0-32 0 0,0 0-8 0 0,0 0 0 0 0</inkml:trace>
+</inkml:ink>
+</file>
+
+<file path=ppt/ink/ink18.xml><?xml version="1.0" encoding="utf-8"?>
+<inkml:ink xmlns:inkml="http://www.w3.org/2003/InkML">
+  <inkml:definitions>
+    <inkml:context xml:id="ctx0">
+      <inkml:inkSource xml:id="inkSrc0">
+        <inkml:traceFormat>
+          <inkml:channel name="X" type="integer" min="-2.14748E9" max="2.14748E9" units="cm"/>
+          <inkml:channel name="Y" type="integer" min="-2.14748E9" max="2.14748E9" units="cm"/>
+          <inkml:channel name="F" type="integer" max="32767" units="dev"/>
+          <inkml:channel name="OA" type="integer" max="360" units="deg"/>
+          <inkml:channel name="OE" type="integer" max="90" units="deg"/>
+        </inkml:traceFormat>
+        <inkml:channelProperties>
+          <inkml:channelProperty channel="X" name="resolution" value="1000" units="1/cm"/>
+          <inkml:channelProperty channel="Y" name="resolution" value="1000" units="1/cm"/>
+          <inkml:channelProperty channel="F" name="resolution" value="0" units="1/dev"/>
+          <inkml:channelProperty channel="OA" name="resolution" value="1000" units="1/deg"/>
+          <inkml:channelProperty channel="OE" name="resolution" value="1000" units="1/deg"/>
+        </inkml:channelProperties>
+      </inkml:inkSource>
+      <inkml:timestamp xml:id="ts0" timeString="2020-03-31T07:19:50.760"/>
+    </inkml:context>
+    <inkml:brush xml:id="br0">
+      <inkml:brushProperty name="width" value="0.05" units="cm"/>
+      <inkml:brushProperty name="height" value="0.05" units="cm"/>
+      <inkml:brushProperty name="color" value="#333333"/>
+    </inkml:brush>
+  </inkml:definitions>
+  <inkml:trace contextRef="#ctx0" brushRef="#br0">105 1 2304 0 0,'0'0'101'0'0,"-8"3"198"0"0,-13 10 4190 0 0,16-9-4051 0 0,1 0 0 0 0,-1 1 0 0 0,1-1 0 0 0,0 1 1 0 0,-2 2-439 0 0,1 2 240 0 0,0 0-1 0 0,0 0 1 0 0,1 1 0 0 0,0 0 0 0 0,0-1 0 0 0,1 1 0 0 0,1 0 0 0 0,-1 0 0 0 0,2 1-1 0 0,-1-1 1 0 0,1 2-240 0 0,0 7 441 0 0,-1 0-1 0 0,-2 4-440 0 0,3-13 121 0 0,0-7-72 0 0,1 1 0 0 0,0-1 0 0 0,0 0 0 0 0,1 0 0 0 0,-1 1 0 0 0,1-1 0 0 0,0 0 1 0 0,0 0-1 0 0,0 2-49 0 0,4 14 206 0 0,2-1 31 0 0,-6-16-154 0 0,0-1-3 0 0,0-1-78 0 0,-1 1 1 0 0,1 0 0 0 0,0-1 0 0 0,-1 1 0 0 0,1-1 0 0 0,0 1 0 0 0,0-1-1 0 0,-1 1 1 0 0,1-1 0 0 0,0 0 0 0 0,0 0 0 0 0,0 1 0 0 0,0-1-1 0 0,-1 0 1 0 0,1 0 0 0 0,0 0 0 0 0,0 0 0 0 0,0 0 0 0 0,0 0 0 0 0,0 0-1 0 0,0 0 1 0 0,0 0 0 0 0,-1 0 0 0 0,1 0 0 0 0,0-1 0 0 0,0 1 0 0 0,0 0-1 0 0,0-1 1 0 0,-1 1 0 0 0,1 0 0 0 0,0-1 0 0 0,0 1 0 0 0,-1-1-1 0 0,1 1 1 0 0,0-1 0 0 0,-1 0 0 0 0,1 1 0 0 0,0-1 0 0 0,-1 0 0 0 0,1 1-1 0 0,-1-1 1 0 0,1 0-3 0 0,0-1 25 0 0,5-4 14 0 0,-3 3-22 0 0,-1 0 1 0 0,1 1-1 0 0,-1-1 1 0 0,0 0-1 0 0,0-1 1 0 0,0 1-18 0 0,34-59 122 0 0,-28 47-75 0 0,4-9-40 0 0,-9 15 0 0 0,-1 3 5 0 0,0 0 0 0 0,0 1 0 0 0,1-1 0 0 0,-1 0 1 0 0,1 1-1 0 0,2-3-12 0 0,-4 7 34 0 0,-1 3 12 0 0,0 0-37 0 0,-1 1-1 0 0,2-1 1 0 0,-1 0 0 0 0,0 1 0 0 0,0-1 0 0 0,1 0 0 0 0,-1 1 0 0 0,1-1 0 0 0,0 2-9 0 0,1 5 16 0 0,-3-4-18 0 0,6 20 14 0 0,1-8 19 0 0,2 6-8 0 0,-8-20-23 0 0,0-2 0 0 0,0 0 0 0 0,0 0 0 0 0,0 0 0 0 0,1 0 0 0 0,-1 0 0 0 0,0 0 0 0 0,1 0 0 0 0,-1 0 0 0 0,1 0 0 0 0,-1-1 0 0 0,1 1 0 0 0,-1 0 0 0 0,1 0 0 0 0,-1 0 0 0 0,1 0 0 0 0,0-1 0 0 0,0 1 0 0 0,11 22 10 0 0,-11-22 44 0 0,0 0-1 0 0,0-1-61 0 0,0 1 1 0 0,0-1-1 0 0,0 0 0 0 0,0 0 0 0 0,0 1 1 0 0,0-1-1 0 0,0 0 0 0 0,0 0 1 0 0,0 0-1 0 0,1 0 0 0 0,-1 0 1 0 0,0 0-1 0 0,0 0 0 0 0,0 0 1 0 0,0-1-1 0 0,0 1 0 0 0,0 0 1 0 0,0-1-1 0 0,0 1 0 0 0,0-1 1 0 0,0 1-1 0 0,0-1 0 0 0,0 1 0 0 0,0-1 1 0 0,0 0-1 0 0,-1 1 0 0 0,1-1 1 0 0,0 0 7 0 0,4-3-121 0 0,-3 3-45 0 0,0-1 0 0 0,0 1 0 0 0,1-1-1 0 0,-2 0 1 0 0,1 0 0 0 0,0 0 0 0 0,0 0 0 0 0,0 0 0 0 0,-1 0 0 0 0,2-2 166 0 0,1-4-1376 0 0</inkml:trace>
+</inkml:ink>
+</file>
+
+<file path=ppt/ink/ink19.xml><?xml version="1.0" encoding="utf-8"?>
+<inkml:ink xmlns:inkml="http://www.w3.org/2003/InkML">
+  <inkml:definitions>
+    <inkml:context xml:id="ctx0">
+      <inkml:inkSource xml:id="inkSrc0">
+        <inkml:traceFormat>
+          <inkml:channel name="X" type="integer" min="-2.14748E9" max="2.14748E9" units="cm"/>
+          <inkml:channel name="Y" type="integer" min="-2.14748E9" max="2.14748E9" units="cm"/>
+          <inkml:channel name="F" type="integer" max="32767" units="dev"/>
+          <inkml:channel name="OA" type="integer" max="360" units="deg"/>
+          <inkml:channel name="OE" type="integer" max="90" units="deg"/>
+        </inkml:traceFormat>
+        <inkml:channelProperties>
+          <inkml:channelProperty channel="X" name="resolution" value="1000" units="1/cm"/>
+          <inkml:channelProperty channel="Y" name="resolution" value="1000" units="1/cm"/>
+          <inkml:channelProperty channel="F" name="resolution" value="0" units="1/dev"/>
+          <inkml:channelProperty channel="OA" name="resolution" value="1000" units="1/deg"/>
+          <inkml:channelProperty channel="OE" name="resolution" value="1000" units="1/deg"/>
+        </inkml:channelProperties>
+      </inkml:inkSource>
+      <inkml:timestamp xml:id="ts0" timeString="2020-03-31T07:19:51.181"/>
+    </inkml:context>
+    <inkml:brush xml:id="br0">
+      <inkml:brushProperty name="width" value="0.05" units="cm"/>
+      <inkml:brushProperty name="height" value="0.05" units="cm"/>
+      <inkml:brushProperty name="color" value="#333333"/>
+    </inkml:brush>
+  </inkml:definitions>
+  <inkml:trace contextRef="#ctx0" brushRef="#br0">1 254 7488 0 0,'0'0'166'0'0,"0"0"29"0"0,0 0 12 0 0,9-9 49 0 0,-3 5 21 0 0,0 0 1 0 0,0 0-1 0 0,1 0 1 0 0,-1 1-1 0 0,5-2-277 0 0,21-11 699 0 0,-24 12-538 0 0,0 0 1 0 0,1 0-1 0 0,0 1 0 0 0,-1 0 0 0 0,5 0-161 0 0,-1-1 237 0 0,1 0 0 0 0,7-4-237 0 0,104-43 784 0 0,-58 15-702 0 0,-34 21-79 0 0,50-20 58 0 0,-64 29-124 0 0,-3-1-293 0 0,0 2 0 0 0,1 0 0 0 0,3 0 356 0 0,-12 3-509 0 0,-5 2-3 0 0</inkml:trace>
+</inkml:ink>
+</file>
+
 <file path=ppt/ink/ink2.xml><?xml version="1.0" encoding="utf-8"?>
 <inkml:ink xmlns:inkml="http://www.w3.org/2003/InkML">
   <inkml:definitions>
@@ -468,6 +564,134 @@
     </inkml:brush>
   </inkml:definitions>
   <inkml:trace contextRef="#ctx0" brushRef="#br0">38 233 14744 0 0,'-3'-2'240'0'0,"1"0"1"0"0,0 0 0 0 0,-1 1-1 0 0,0-1 1 0 0,1 0 0 0 0,-1 1-1 0 0,0 0 1 0 0,0-1-1 0 0,0 1 1 0 0,0 0 0 0 0,0 1-1 0 0,-1-1-240 0 0,3 1 391 0 0,2-3-388 0 0,1 1-1 0 0,-1 0 1 0 0,1 0 0 0 0,-1 0-1 0 0,1 0 1 0 0,0 0-1 0 0,-1 0 1 0 0,1 1 0 0 0,0-1-1 0 0,0 0 1 0 0,1 1 0 0 0,-1 0-1 0 0,1-2-2 0 0,3 0-3 0 0,66-43-51 0 0,-52 32 53 0 0,1 1 0 0 0,1 1 0 0 0,0 1 0 0 0,2 0 1 0 0,94-35 38 0 0,-88 35 3 0 0,-16 7-13 0 0,0-1-1 0 0,0 2 0 0 0,0 0 1 0 0,0 0-1 0 0,0 2 1 0 0,1 0-1 0 0,-1 0 0 0 0,1 1 1 0 0,8 2-28 0 0,-13-1 83 0 0,0 1 0 0 0,0 0 1 0 0,0 1-1 0 0,0 0 0 0 0,0 0 0 0 0,0 1 1 0 0,-1 0-1 0 0,0 1 0 0 0,0 0 1 0 0,0 1-1 0 0,0 0 0 0 0,-1 0 0 0 0,6 6-83 0 0,0 1 211 0 0,-1 1-1 0 0,-1 1 0 0 0,0 0 0 0 0,-1 1 0 0 0,-1 0 0 0 0,0 0 1 0 0,-1 1-1 0 0,-1 0 0 0 0,1 6-210 0 0,-1-2 157 0 0,-1 1 1 0 0,-1 0-1 0 0,-1 1 0 0 0,-1 0 1 0 0,-1 0-1 0 0,-2-1 1 0 0,1 13-158 0 0,-12 222 658 0 0,-14 35-658 0 0,14-189-62 0 0,6-47-891 0 0,4 45 953 0 0,7 2-3615 0 0,0-57-3194 0 0</inkml:trace>
+</inkml:ink>
+</file>
+
+<file path=ppt/ink/ink20.xml><?xml version="1.0" encoding="utf-8"?>
+<inkml:ink xmlns:inkml="http://www.w3.org/2003/InkML">
+  <inkml:definitions>
+    <inkml:context xml:id="ctx0">
+      <inkml:inkSource xml:id="inkSrc0">
+        <inkml:traceFormat>
+          <inkml:channel name="X" type="integer" min="-2.14748E9" max="2.14748E9" units="cm"/>
+          <inkml:channel name="Y" type="integer" min="-2.14748E9" max="2.14748E9" units="cm"/>
+          <inkml:channel name="F" type="integer" max="32767" units="dev"/>
+          <inkml:channel name="OA" type="integer" max="360" units="deg"/>
+          <inkml:channel name="OE" type="integer" max="90" units="deg"/>
+        </inkml:traceFormat>
+        <inkml:channelProperties>
+          <inkml:channelProperty channel="X" name="resolution" value="1000" units="1/cm"/>
+          <inkml:channelProperty channel="Y" name="resolution" value="1000" units="1/cm"/>
+          <inkml:channelProperty channel="F" name="resolution" value="0" units="1/dev"/>
+          <inkml:channelProperty channel="OA" name="resolution" value="1000" units="1/deg"/>
+          <inkml:channelProperty channel="OE" name="resolution" value="1000" units="1/deg"/>
+        </inkml:channelProperties>
+      </inkml:inkSource>
+      <inkml:timestamp xml:id="ts0" timeString="2020-03-31T07:19:51.511"/>
+    </inkml:context>
+    <inkml:brush xml:id="br0">
+      <inkml:brushProperty name="width" value="0.05" units="cm"/>
+      <inkml:brushProperty name="height" value="0.05" units="cm"/>
+      <inkml:brushProperty name="color" value="#333333"/>
+    </inkml:brush>
+  </inkml:definitions>
+  <inkml:trace contextRef="#ctx0" brushRef="#br0">0 6 4144 0 0,'0'0'319'0'0,"0"0"-78"0"0,0 0 454 0 0,0 0 215 0 0,0 0 46 0 0,0 0-64 0 0,0 0-312 0 0,0 0-136 0 0,0 0-27 0 0,0 0-18 0 0,2 0-47 0 0,14-2 279 0 0,-14 1-520 0 0,1 0 1 0 0,0 1-1 0 0,0-1 1 0 0,-1 1 0 0 0,1 0-1 0 0,0 0 1 0 0,-1 0-1 0 0,1 0 1 0 0,0 0 0 0 0,1 1-112 0 0,63 18 1974 0 0,-57-15-1862 0 0,0-1 0 0 0,0 2 0 0 0,-1 0 0 0 0,1 0 0 0 0,-1 0 0 0 0,0 1 0 0 0,4 5-112 0 0,-9-8 13 0 0,-1 0 1 0 0,0 0 0 0 0,0 1-1 0 0,0-1 1 0 0,0 1-1 0 0,-1 0 1 0 0,1 0-1 0 0,-1 0 1 0 0,0 0-1 0 0,0 0 1 0 0,-1 0 0 0 0,1 1-1 0 0,-1-1 1 0 0,0 1-1 0 0,0-1 1 0 0,0 1-1 0 0,-1-1 1 0 0,1 1 0 0 0,-1 0-14 0 0,0 15-6 0 0,1-10 20 0 0,-1-1-1 0 0,0 1 0 0 0,-1-1 1 0 0,0 1-1 0 0,0-1 0 0 0,-2 4-13 0 0,0-3-3 0 0,1 1 0 0 0,1-1 0 0 0,-1 9 3 0 0,-2 12-313 0 0,3-19-583 0 0,1 1-288 0 0</inkml:trace>
+</inkml:ink>
+</file>
+
+<file path=ppt/ink/ink21.xml><?xml version="1.0" encoding="utf-8"?>
+<inkml:ink xmlns:inkml="http://www.w3.org/2003/InkML">
+  <inkml:definitions>
+    <inkml:context xml:id="ctx0">
+      <inkml:inkSource xml:id="inkSrc0">
+        <inkml:traceFormat>
+          <inkml:channel name="X" type="integer" min="-2.14748E9" max="2.14748E9" units="cm"/>
+          <inkml:channel name="Y" type="integer" min="-2.14748E9" max="2.14748E9" units="cm"/>
+          <inkml:channel name="F" type="integer" max="32767" units="dev"/>
+          <inkml:channel name="OA" type="integer" max="360" units="deg"/>
+          <inkml:channel name="OE" type="integer" max="90" units="deg"/>
+        </inkml:traceFormat>
+        <inkml:channelProperties>
+          <inkml:channelProperty channel="X" name="resolution" value="1000" units="1/cm"/>
+          <inkml:channelProperty channel="Y" name="resolution" value="1000" units="1/cm"/>
+          <inkml:channelProperty channel="F" name="resolution" value="0" units="1/dev"/>
+          <inkml:channelProperty channel="OA" name="resolution" value="1000" units="1/deg"/>
+          <inkml:channelProperty channel="OE" name="resolution" value="1000" units="1/deg"/>
+        </inkml:channelProperties>
+      </inkml:inkSource>
+      <inkml:timestamp xml:id="ts0" timeString="2020-03-31T07:19:52.412"/>
+    </inkml:context>
+    <inkml:brush xml:id="br0">
+      <inkml:brushProperty name="width" value="0.05" units="cm"/>
+      <inkml:brushProperty name="height" value="0.05" units="cm"/>
+      <inkml:brushProperty name="color" value="#333333"/>
+    </inkml:brush>
+  </inkml:definitions>
+  <inkml:trace contextRef="#ctx0" brushRef="#br0">229 0 2760 0 0,'-4'8'248'0'0,"-3"21"847"0"0,0 1 1019 0 0,-9 34 99 0 0,13-50-1903 0 0,1 1 0 0 0,1 0 0 0 0,0 0 0 0 0,0 0 0 0 0,2 0-1 0 0,0 1-309 0 0,0 23 573 0 0,0-24-251 0 0,0 0 0 0 0,1 0 0 0 0,1 6-322 0 0,-2-20 12 0 0,1 21 388 0 0,-2-18-343 0 0,0 0 0 0 0,0 0 0 0 0,1 1 0 0 0,0-1 0 0 0,0 0 0 0 0,0 0 1 0 0,1 2-58 0 0,-2-4 90 0 0,0-2-16 0 0,0 0 12 0 0,0 0 10 0 0,0 0-20 0 0,0 0-10 0 0,13-2 94 0 0,-10 0-119 0 0,0 0 0 0 0,0-1 0 0 0,-1 0 0 0 0,1 1 0 0 0,-1-1 1 0 0,0 0-1 0 0,0 0 0 0 0,0 0 0 0 0,1-2-41 0 0,-1 1 48 0 0,10-16 183 0 0,-10 15-182 0 0,0 0-1 0 0,1 1 1 0 0,0-1 0 0 0,0 1-1 0 0,0 0 1 0 0,0 0-49 0 0,10-10 104 0 0,-9 8-50 0 0,1 1-1 0 0,0-1 0 0 0,1 1 0 0 0,-1 0 1 0 0,1 0-1 0 0,0 1 0 0 0,0-1 1 0 0,1 1-54 0 0,25-18 336 0 0,-31 22-254 0 0,0 0-70 0 0,0 0 1 0 0,0 0-1 0 0,0 0 0 0 0,0 0 0 0 0,0 0 1 0 0,0 0-1 0 0,-1 1 0 0 0,1-1 0 0 0,0 0 1 0 0,0 1-1 0 0,0-1 0 0 0,-1 0 0 0 0,1 1 1 0 0,0-1-1 0 0,0 1 0 0 0,-1 0 0 0 0,1-1 1 0 0,0 1-13 0 0,14 12 81 0 0,-12-10-46 0 0,0 0 1 0 0,0 1 0 0 0,0-1 0 0 0,-1 1 0 0 0,0-1-1 0 0,0 1 1 0 0,0 0 0 0 0,0 0 0 0 0,0 0 0 0 0,-1 0-1 0 0,0 0 1 0 0,0 0 0 0 0,0 0 0 0 0,0 1 0 0 0,-1-1-1 0 0,1 0 1 0 0,-1 0-36 0 0,0 13 225 0 0,-1 0-1 0 0,0 0 1 0 0,-3 12-225 0 0,2-18 77 0 0,1-7-34 0 0,0 1 0 0 0,0-1 0 0 0,-1 0 0 0 0,1 1-1 0 0,-1-1 1 0 0,-1 2-43 0 0,-7 17 143 0 0,8-16-95 0 0,0 1 0 0 0,0-1 0 0 0,-1 0 0 0 0,0 0 0 0 0,-1 0 0 0 0,0-1 0 0 0,0 1 0 0 0,0-1 0 0 0,-1 0 0 0 0,-3 4-48 0 0,-9 9 117 0 0,-1 0 0 0 0,-1-1 0 0 0,-1-1-1 0 0,-19 13-116 0 0,31-24-25 0 0,-1-1-1 0 0,0 0 1 0 0,1-1-1 0 0,-1 0 1 0 0,-1-1 0 0 0,1 0-1 0 0,-1 0 1 0 0,1-1-1 0 0,-1 0 1 0 0,0 0-1 0 0,1-1 1 0 0,-1-1 0 0 0,0 0-1 0 0,-9 0 26 0 0,12-1-300 0 0,0 0-1 0 0,0 0 1 0 0,0 0 0 0 0,1-1 0 0 0,-1 0-1 0 0,0 0 1 0 0,1-1 0 0 0,-1 0-1 0 0,1 0 1 0 0,0 0 0 0 0,-1-1-1 0 0,-1-2 301 0 0,-5-7-1338 0 0</inkml:trace>
+</inkml:ink>
+</file>
+
+<file path=ppt/ink/ink22.xml><?xml version="1.0" encoding="utf-8"?>
+<inkml:ink xmlns:inkml="http://www.w3.org/2003/InkML">
+  <inkml:definitions>
+    <inkml:context xml:id="ctx0">
+      <inkml:inkSource xml:id="inkSrc0">
+        <inkml:traceFormat>
+          <inkml:channel name="X" type="integer" min="-2.14748E9" max="2.14748E9" units="cm"/>
+          <inkml:channel name="Y" type="integer" min="-2.14748E9" max="2.14748E9" units="cm"/>
+          <inkml:channel name="F" type="integer" max="32767" units="dev"/>
+          <inkml:channel name="OA" type="integer" max="360" units="deg"/>
+          <inkml:channel name="OE" type="integer" max="90" units="deg"/>
+        </inkml:traceFormat>
+        <inkml:channelProperties>
+          <inkml:channelProperty channel="X" name="resolution" value="1000" units="1/cm"/>
+          <inkml:channelProperty channel="Y" name="resolution" value="1000" units="1/cm"/>
+          <inkml:channelProperty channel="F" name="resolution" value="0" units="1/dev"/>
+          <inkml:channelProperty channel="OA" name="resolution" value="1000" units="1/deg"/>
+          <inkml:channelProperty channel="OE" name="resolution" value="1000" units="1/deg"/>
+        </inkml:channelProperties>
+      </inkml:inkSource>
+      <inkml:timestamp xml:id="ts0" timeString="2020-03-31T07:19:52.766"/>
+    </inkml:context>
+    <inkml:brush xml:id="br0">
+      <inkml:brushProperty name="width" value="0.05" units="cm"/>
+      <inkml:brushProperty name="height" value="0.05" units="cm"/>
+      <inkml:brushProperty name="color" value="#333333"/>
+    </inkml:brush>
+  </inkml:definitions>
+  <inkml:trace contextRef="#ctx0" brushRef="#br0">1 266 2304 0 0,'0'0'101'0'0,"2"0"1"0"0,6-6 369 0 0,-6 5-87 0 0,-1 0 0 0 0,1-1 0 0 0,0 1 0 0 0,-1 0 0 0 0,1 0 0 0 0,0 1 0 0 0,0-1 0 0 0,0 0 0 0 0,0 1 0 0 0,-1-1 0 0 0,2 1-384 0 0,40-9 3716 0 0,-1-2-1 0 0,10-4-3715 0 0,-13 3 695 0 0,56-19 233 0 0,-33 4-904 0 0,-28 14 13 0 0,0-2 1 0 0,-1-1 0 0 0,7-6-38 0 0,-32 18 15 0 0,6-5-59 0 0,0 0 0 0 0,0-1 0 0 0,-1 0 0 0 0,6-6 44 0 0,-5 7-201 0 0,-14 9 164 0 0,1 0 1 0 0,0 0-1 0 0,0-1 1 0 0,0 1 0 0 0,-1-1-1 0 0,1 1 1 0 0,0-1-1 0 0,-1 1 1 0 0,1-1 0 0 0,0 1-1 0 0,-1-1 1 0 0,1 1-1 0 0,-1-1 1 0 0,1 0 0 0 0,-1 1-1 0 0,1-1 1 0 0,-1 0 0 0 0,1 0 36 0 0,-1 0-418 0 0,0 1-174 0 0,0 0-713 0 0,0 0-308 0 0</inkml:trace>
+</inkml:ink>
+</file>
+
+<file path=ppt/ink/ink23.xml><?xml version="1.0" encoding="utf-8"?>
+<inkml:ink xmlns:inkml="http://www.w3.org/2003/InkML">
+  <inkml:definitions>
+    <inkml:context xml:id="ctx0">
+      <inkml:inkSource xml:id="inkSrc0">
+        <inkml:traceFormat>
+          <inkml:channel name="X" type="integer" min="-2.14748E9" max="2.14748E9" units="cm"/>
+          <inkml:channel name="Y" type="integer" min="-2.14748E9" max="2.14748E9" units="cm"/>
+          <inkml:channel name="F" type="integer" max="32767" units="dev"/>
+          <inkml:channel name="OA" type="integer" max="360" units="deg"/>
+          <inkml:channel name="OE" type="integer" max="90" units="deg"/>
+        </inkml:traceFormat>
+        <inkml:channelProperties>
+          <inkml:channelProperty channel="X" name="resolution" value="1000" units="1/cm"/>
+          <inkml:channelProperty channel="Y" name="resolution" value="1000" units="1/cm"/>
+          <inkml:channelProperty channel="F" name="resolution" value="0" units="1/dev"/>
+          <inkml:channelProperty channel="OA" name="resolution" value="1000" units="1/deg"/>
+          <inkml:channelProperty channel="OE" name="resolution" value="1000" units="1/deg"/>
+        </inkml:channelProperties>
+      </inkml:inkSource>
+      <inkml:timestamp xml:id="ts0" timeString="2020-03-31T07:19:53.113"/>
+    </inkml:context>
+    <inkml:brush xml:id="br0">
+      <inkml:brushProperty name="width" value="0.05" units="cm"/>
+      <inkml:brushProperty name="height" value="0.05" units="cm"/>
+      <inkml:brushProperty name="color" value="#333333"/>
+    </inkml:brush>
+  </inkml:definitions>
+  <inkml:trace contextRef="#ctx0" brushRef="#br0">1 38 7280 0 0,'0'0'332'0'0,"0"0"-4"0"0,0 0-119 0 0,0 0 272 0 0,0 0 139 0 0,0 0 27 0 0,6-8 966 0 0,2 3-1104 0 0,0 0 0 0 0,0 1 0 0 0,1 0 0 0 0,-1 1 0 0 0,6-2-509 0 0,-9 4 140 0 0,0 0 1 0 0,-1 0-1 0 0,1 1 0 0 0,0 0 1 0 0,-1 0-1 0 0,1 0 1 0 0,0 0-1 0 0,0 1 0 0 0,-1-1 1 0 0,1 1-1 0 0,0 1 1 0 0,0-1-141 0 0,10 3 280 0 0,-11-3-205 0 0,0 0 0 0 0,0 0 0 0 0,-1 1 0 0 0,1-1 0 0 0,0 1 0 0 0,-1-1 0 0 0,1 1 0 0 0,-1 0 1 0 0,1 1-1 0 0,-1-1 0 0 0,0 1 0 0 0,1 0-75 0 0,-1 1 40 0 0,1 0 0 0 0,0 1 1 0 0,-1 0-1 0 0,0 0 0 0 0,0 0 0 0 0,-1 0 1 0 0,0 0-1 0 0,1 1 0 0 0,-2-1 0 0 0,1 1 1 0 0,0-1-1 0 0,-1 5-40 0 0,1 0 79 0 0,-1 1 0 0 0,0 0 1 0 0,-1-1-1 0 0,0 1 0 0 0,-1 0 0 0 0,-1 3-79 0 0,-3 12 143 0 0,-1 1 0 0 0,-2-1-1 0 0,-4 9-142 0 0,3-9 47 0 0,-39 98 70 0 0,41-103 77 0 0,2-4-1086 0 0,1-4-5937 0 0,4-13 4909 0 0</inkml:trace>
 </inkml:ink>
 </file>
 
@@ -9976,7 +10200,7 @@
           <a:graphicData uri="http://schemas.openxmlformats.org/presentationml/2006/ole">
             <mc:AlternateContent xmlns:mc="http://schemas.openxmlformats.org/markup-compatibility/2006">
               <mc:Choice xmlns:v="urn:schemas-microsoft-com:vml" Requires="v">
-                <p:oleObj spid="_x0000_s1042" name="Bitkép alakzat" r:id="rId5" imgW="1914286" imgH="1905266" progId="PBrush">
+                <p:oleObj spid="_x0000_s1048" name="Bitkép alakzat" r:id="rId5" imgW="1914286" imgH="1905266" progId="PBrush">
                   <p:embed/>
                 </p:oleObj>
               </mc:Choice>
@@ -10115,7 +10339,7 @@
           <a:graphicData uri="http://schemas.openxmlformats.org/presentationml/2006/ole">
             <mc:AlternateContent xmlns:mc="http://schemas.openxmlformats.org/markup-compatibility/2006">
               <mc:Choice xmlns:v="urn:schemas-microsoft-com:vml" Requires="v">
-                <p:oleObj spid="_x0000_s1043" name="Klip" r:id="rId7" imgW="3597275" imgH="3390900" progId="">
+                <p:oleObj spid="_x0000_s1049" name="Klip" r:id="rId7" imgW="3597275" imgH="3390900" progId="">
                   <p:embed/>
                 </p:oleObj>
               </mc:Choice>
@@ -28933,8 +29157,8 @@
             <a:chExt cx="3887640" cy="2381400"/>
           </a:xfrm>
         </p:grpSpPr>
-        <mc:AlternateContent xmlns:mc="http://schemas.openxmlformats.org/markup-compatibility/2006">
-          <mc:Choice xmlns:p14="http://schemas.microsoft.com/office/powerpoint/2010/main" Requires="p14">
+        <mc:AlternateContent xmlns:mc="http://schemas.openxmlformats.org/markup-compatibility/2006" xmlns:p14="http://schemas.microsoft.com/office/powerpoint/2010/main">
+          <mc:Choice Requires="p14">
             <p:contentPart p14:bwMode="auto" r:id="rId2">
               <p14:nvContentPartPr>
                 <p14:cNvPr id="18" name="Ink 17">
@@ -28953,7 +29177,7 @@
               </p14:xfrm>
             </p:contentPart>
           </mc:Choice>
-          <mc:Fallback>
+          <mc:Fallback xmlns="">
             <p:pic>
               <p:nvPicPr>
                 <p:cNvPr id="18" name="Ink 17">
@@ -28984,8 +29208,8 @@
             </p:pic>
           </mc:Fallback>
         </mc:AlternateContent>
-        <mc:AlternateContent xmlns:mc="http://schemas.openxmlformats.org/markup-compatibility/2006">
-          <mc:Choice xmlns:p14="http://schemas.microsoft.com/office/powerpoint/2010/main" Requires="p14">
+        <mc:AlternateContent xmlns:mc="http://schemas.openxmlformats.org/markup-compatibility/2006" xmlns:p14="http://schemas.microsoft.com/office/powerpoint/2010/main">
+          <mc:Choice Requires="p14">
             <p:contentPart p14:bwMode="auto" r:id="rId4">
               <p14:nvContentPartPr>
                 <p14:cNvPr id="19" name="Ink 18">
@@ -29004,7 +29228,7 @@
               </p14:xfrm>
             </p:contentPart>
           </mc:Choice>
-          <mc:Fallback>
+          <mc:Fallback xmlns="">
             <p:pic>
               <p:nvPicPr>
                 <p:cNvPr id="19" name="Ink 18">
@@ -29035,8 +29259,8 @@
             </p:pic>
           </mc:Fallback>
         </mc:AlternateContent>
-        <mc:AlternateContent xmlns:mc="http://schemas.openxmlformats.org/markup-compatibility/2006">
-          <mc:Choice xmlns:p14="http://schemas.microsoft.com/office/powerpoint/2010/main" Requires="p14">
+        <mc:AlternateContent xmlns:mc="http://schemas.openxmlformats.org/markup-compatibility/2006" xmlns:p14="http://schemas.microsoft.com/office/powerpoint/2010/main">
+          <mc:Choice Requires="p14">
             <p:contentPart p14:bwMode="auto" r:id="rId6">
               <p14:nvContentPartPr>
                 <p14:cNvPr id="21" name="Ink 20">
@@ -29055,7 +29279,7 @@
               </p14:xfrm>
             </p:contentPart>
           </mc:Choice>
-          <mc:Fallback>
+          <mc:Fallback xmlns="">
             <p:pic>
               <p:nvPicPr>
                 <p:cNvPr id="21" name="Ink 20">
@@ -29086,8 +29310,8 @@
             </p:pic>
           </mc:Fallback>
         </mc:AlternateContent>
-        <mc:AlternateContent xmlns:mc="http://schemas.openxmlformats.org/markup-compatibility/2006">
-          <mc:Choice xmlns:p14="http://schemas.microsoft.com/office/powerpoint/2010/main" Requires="p14">
+        <mc:AlternateContent xmlns:mc="http://schemas.openxmlformats.org/markup-compatibility/2006" xmlns:p14="http://schemas.microsoft.com/office/powerpoint/2010/main">
+          <mc:Choice Requires="p14">
             <p:contentPart p14:bwMode="auto" r:id="rId8">
               <p14:nvContentPartPr>
                 <p14:cNvPr id="22" name="Ink 21">
@@ -29106,7 +29330,7 @@
               </p14:xfrm>
             </p:contentPart>
           </mc:Choice>
-          <mc:Fallback>
+          <mc:Fallback xmlns="">
             <p:pic>
               <p:nvPicPr>
                 <p:cNvPr id="22" name="Ink 21">
@@ -29137,8 +29361,8 @@
             </p:pic>
           </mc:Fallback>
         </mc:AlternateContent>
-        <mc:AlternateContent xmlns:mc="http://schemas.openxmlformats.org/markup-compatibility/2006">
-          <mc:Choice xmlns:p14="http://schemas.microsoft.com/office/powerpoint/2010/main" Requires="p14">
+        <mc:AlternateContent xmlns:mc="http://schemas.openxmlformats.org/markup-compatibility/2006" xmlns:p14="http://schemas.microsoft.com/office/powerpoint/2010/main">
+          <mc:Choice Requires="p14">
             <p:contentPart p14:bwMode="auto" r:id="rId10">
               <p14:nvContentPartPr>
                 <p14:cNvPr id="30" name="Ink 29">
@@ -29157,7 +29381,7 @@
               </p14:xfrm>
             </p:contentPart>
           </mc:Choice>
-          <mc:Fallback>
+          <mc:Fallback xmlns="">
             <p:pic>
               <p:nvPicPr>
                 <p:cNvPr id="30" name="Ink 29">
@@ -29188,8 +29412,8 @@
             </p:pic>
           </mc:Fallback>
         </mc:AlternateContent>
-        <mc:AlternateContent xmlns:mc="http://schemas.openxmlformats.org/markup-compatibility/2006">
-          <mc:Choice xmlns:p14="http://schemas.microsoft.com/office/powerpoint/2010/main" Requires="p14">
+        <mc:AlternateContent xmlns:mc="http://schemas.openxmlformats.org/markup-compatibility/2006" xmlns:p14="http://schemas.microsoft.com/office/powerpoint/2010/main">
+          <mc:Choice Requires="p14">
             <p:contentPart p14:bwMode="auto" r:id="rId12">
               <p14:nvContentPartPr>
                 <p14:cNvPr id="31" name="Ink 30">
@@ -29208,7 +29432,7 @@
               </p14:xfrm>
             </p:contentPart>
           </mc:Choice>
-          <mc:Fallback>
+          <mc:Fallback xmlns="">
             <p:pic>
               <p:nvPicPr>
                 <p:cNvPr id="31" name="Ink 30">
@@ -29239,8 +29463,8 @@
             </p:pic>
           </mc:Fallback>
         </mc:AlternateContent>
-        <mc:AlternateContent xmlns:mc="http://schemas.openxmlformats.org/markup-compatibility/2006">
-          <mc:Choice xmlns:p14="http://schemas.microsoft.com/office/powerpoint/2010/main" Requires="p14">
+        <mc:AlternateContent xmlns:mc="http://schemas.openxmlformats.org/markup-compatibility/2006" xmlns:p14="http://schemas.microsoft.com/office/powerpoint/2010/main">
+          <mc:Choice Requires="p14">
             <p:contentPart p14:bwMode="auto" r:id="rId14">
               <p14:nvContentPartPr>
                 <p14:cNvPr id="174081" name="Ink 174080">
@@ -29259,7 +29483,7 @@
               </p14:xfrm>
             </p:contentPart>
           </mc:Choice>
-          <mc:Fallback>
+          <mc:Fallback xmlns="">
             <p:pic>
               <p:nvPicPr>
                 <p:cNvPr id="174081" name="Ink 174080">
@@ -29290,8 +29514,8 @@
             </p:pic>
           </mc:Fallback>
         </mc:AlternateContent>
-        <mc:AlternateContent xmlns:mc="http://schemas.openxmlformats.org/markup-compatibility/2006">
-          <mc:Choice xmlns:p14="http://schemas.microsoft.com/office/powerpoint/2010/main" Requires="p14">
+        <mc:AlternateContent xmlns:mc="http://schemas.openxmlformats.org/markup-compatibility/2006" xmlns:p14="http://schemas.microsoft.com/office/powerpoint/2010/main">
+          <mc:Choice Requires="p14">
             <p:contentPart p14:bwMode="auto" r:id="rId16">
               <p14:nvContentPartPr>
                 <p14:cNvPr id="174082" name="Ink 174081">
@@ -29310,7 +29534,7 @@
               </p14:xfrm>
             </p:contentPart>
           </mc:Choice>
-          <mc:Fallback>
+          <mc:Fallback xmlns="">
             <p:pic>
               <p:nvPicPr>
                 <p:cNvPr id="174082" name="Ink 174081">
@@ -33754,8 +33978,8 @@
             <a:chExt cx="294480" cy="290520"/>
           </a:xfrm>
         </p:grpSpPr>
-        <mc:AlternateContent xmlns:mc="http://schemas.openxmlformats.org/markup-compatibility/2006">
-          <mc:Choice xmlns:p14="http://schemas.microsoft.com/office/powerpoint/2010/main" Requires="p14">
+        <mc:AlternateContent xmlns:mc="http://schemas.openxmlformats.org/markup-compatibility/2006" xmlns:p14="http://schemas.microsoft.com/office/powerpoint/2010/main">
+          <mc:Choice Requires="p14">
             <p:contentPart p14:bwMode="auto" r:id="rId2">
               <p14:nvContentPartPr>
                 <p14:cNvPr id="5" name="Ink 4">
@@ -33774,7 +33998,7 @@
               </p14:xfrm>
             </p:contentPart>
           </mc:Choice>
-          <mc:Fallback>
+          <mc:Fallback xmlns="">
             <p:pic>
               <p:nvPicPr>
                 <p:cNvPr id="5" name="Ink 4">
@@ -33805,8 +34029,8 @@
             </p:pic>
           </mc:Fallback>
         </mc:AlternateContent>
-        <mc:AlternateContent xmlns:mc="http://schemas.openxmlformats.org/markup-compatibility/2006">
-          <mc:Choice xmlns:p14="http://schemas.microsoft.com/office/powerpoint/2010/main" Requires="p14">
+        <mc:AlternateContent xmlns:mc="http://schemas.openxmlformats.org/markup-compatibility/2006" xmlns:p14="http://schemas.microsoft.com/office/powerpoint/2010/main">
+          <mc:Choice Requires="p14">
             <p:contentPart p14:bwMode="auto" r:id="rId4">
               <p14:nvContentPartPr>
                 <p14:cNvPr id="9" name="Ink 8">
@@ -33825,7 +34049,7 @@
               </p14:xfrm>
             </p:contentPart>
           </mc:Choice>
-          <mc:Fallback>
+          <mc:Fallback xmlns="">
             <p:pic>
               <p:nvPicPr>
                 <p:cNvPr id="9" name="Ink 8">
@@ -33877,8 +34101,8 @@
             <a:chExt cx="316080" cy="230040"/>
           </a:xfrm>
         </p:grpSpPr>
-        <mc:AlternateContent xmlns:mc="http://schemas.openxmlformats.org/markup-compatibility/2006">
-          <mc:Choice xmlns:p14="http://schemas.microsoft.com/office/powerpoint/2010/main" Requires="p14">
+        <mc:AlternateContent xmlns:mc="http://schemas.openxmlformats.org/markup-compatibility/2006" xmlns:p14="http://schemas.microsoft.com/office/powerpoint/2010/main">
+          <mc:Choice Requires="p14">
             <p:contentPart p14:bwMode="auto" r:id="rId6">
               <p14:nvContentPartPr>
                 <p14:cNvPr id="10" name="Ink 9">
@@ -33897,7 +34121,7 @@
               </p14:xfrm>
             </p:contentPart>
           </mc:Choice>
-          <mc:Fallback>
+          <mc:Fallback xmlns="">
             <p:pic>
               <p:nvPicPr>
                 <p:cNvPr id="10" name="Ink 9">
@@ -33928,8 +34152,8 @@
             </p:pic>
           </mc:Fallback>
         </mc:AlternateContent>
-        <mc:AlternateContent xmlns:mc="http://schemas.openxmlformats.org/markup-compatibility/2006">
-          <mc:Choice xmlns:p14="http://schemas.microsoft.com/office/powerpoint/2010/main" Requires="p14">
+        <mc:AlternateContent xmlns:mc="http://schemas.openxmlformats.org/markup-compatibility/2006" xmlns:p14="http://schemas.microsoft.com/office/powerpoint/2010/main">
+          <mc:Choice Requires="p14">
             <p:contentPart p14:bwMode="auto" r:id="rId8">
               <p14:nvContentPartPr>
                 <p14:cNvPr id="11" name="Ink 10">
@@ -33948,7 +34172,7 @@
               </p14:xfrm>
             </p:contentPart>
           </mc:Choice>
-          <mc:Fallback>
+          <mc:Fallback xmlns="">
             <p:pic>
               <p:nvPicPr>
                 <p:cNvPr id="11" name="Ink 10">
@@ -34000,8 +34224,8 @@
             <a:chExt cx="348120" cy="202320"/>
           </a:xfrm>
         </p:grpSpPr>
-        <mc:AlternateContent xmlns:mc="http://schemas.openxmlformats.org/markup-compatibility/2006">
-          <mc:Choice xmlns:p14="http://schemas.microsoft.com/office/powerpoint/2010/main" Requires="p14">
+        <mc:AlternateContent xmlns:mc="http://schemas.openxmlformats.org/markup-compatibility/2006" xmlns:p14="http://schemas.microsoft.com/office/powerpoint/2010/main">
+          <mc:Choice Requires="p14">
             <p:contentPart p14:bwMode="auto" r:id="rId10">
               <p14:nvContentPartPr>
                 <p14:cNvPr id="14" name="Ink 13">
@@ -34020,7 +34244,7 @@
               </p14:xfrm>
             </p:contentPart>
           </mc:Choice>
-          <mc:Fallback>
+          <mc:Fallback xmlns="">
             <p:pic>
               <p:nvPicPr>
                 <p:cNvPr id="14" name="Ink 13">
@@ -34051,8 +34275,8 @@
             </p:pic>
           </mc:Fallback>
         </mc:AlternateContent>
-        <mc:AlternateContent xmlns:mc="http://schemas.openxmlformats.org/markup-compatibility/2006">
-          <mc:Choice xmlns:p14="http://schemas.microsoft.com/office/powerpoint/2010/main" Requires="p14">
+        <mc:AlternateContent xmlns:mc="http://schemas.openxmlformats.org/markup-compatibility/2006" xmlns:p14="http://schemas.microsoft.com/office/powerpoint/2010/main">
+          <mc:Choice Requires="p14">
             <p:contentPart p14:bwMode="auto" r:id="rId12">
               <p14:nvContentPartPr>
                 <p14:cNvPr id="15" name="Ink 14">
@@ -34071,7 +34295,7 @@
               </p14:xfrm>
             </p:contentPart>
           </mc:Choice>
-          <mc:Fallback>
+          <mc:Fallback xmlns="">
             <p:pic>
               <p:nvPicPr>
                 <p:cNvPr id="15" name="Ink 14">
@@ -34123,8 +34347,8 @@
             <a:chExt cx="391680" cy="171360"/>
           </a:xfrm>
         </p:grpSpPr>
-        <mc:AlternateContent xmlns:mc="http://schemas.openxmlformats.org/markup-compatibility/2006">
-          <mc:Choice xmlns:p14="http://schemas.microsoft.com/office/powerpoint/2010/main" Requires="p14">
+        <mc:AlternateContent xmlns:mc="http://schemas.openxmlformats.org/markup-compatibility/2006" xmlns:p14="http://schemas.microsoft.com/office/powerpoint/2010/main">
+          <mc:Choice Requires="p14">
             <p:contentPart p14:bwMode="auto" r:id="rId14">
               <p14:nvContentPartPr>
                 <p14:cNvPr id="16" name="Ink 15">
@@ -34143,7 +34367,7 @@
               </p14:xfrm>
             </p:contentPart>
           </mc:Choice>
-          <mc:Fallback>
+          <mc:Fallback xmlns="">
             <p:pic>
               <p:nvPicPr>
                 <p:cNvPr id="16" name="Ink 15">
@@ -34174,8 +34398,8 @@
             </p:pic>
           </mc:Fallback>
         </mc:AlternateContent>
-        <mc:AlternateContent xmlns:mc="http://schemas.openxmlformats.org/markup-compatibility/2006">
-          <mc:Choice xmlns:p14="http://schemas.microsoft.com/office/powerpoint/2010/main" Requires="p14">
+        <mc:AlternateContent xmlns:mc="http://schemas.openxmlformats.org/markup-compatibility/2006" xmlns:p14="http://schemas.microsoft.com/office/powerpoint/2010/main">
+          <mc:Choice Requires="p14">
             <p:contentPart p14:bwMode="auto" r:id="rId16">
               <p14:nvContentPartPr>
                 <p14:cNvPr id="17" name="Ink 16">
@@ -34194,7 +34418,7 @@
               </p14:xfrm>
             </p:contentPart>
           </mc:Choice>
-          <mc:Fallback>
+          <mc:Fallback xmlns="">
             <p:pic>
               <p:nvPicPr>
                 <p:cNvPr id="17" name="Ink 16">
@@ -34217,6 +34441,405 @@
                 <a:xfrm>
                   <a:off x="6834938" y="5085142"/>
                   <a:ext cx="144000" cy="121680"/>
+                </a:xfrm>
+                <a:prstGeom prst="rect">
+                  <a:avLst/>
+                </a:prstGeom>
+              </p:spPr>
+            </p:pic>
+          </mc:Fallback>
+        </mc:AlternateContent>
+      </p:grpSp>
+      <mc:AlternateContent xmlns:mc="http://schemas.openxmlformats.org/markup-compatibility/2006">
+        <mc:Choice xmlns:p14="http://schemas.microsoft.com/office/powerpoint/2010/main" Requires="p14">
+          <p:contentPart p14:bwMode="auto" r:id="rId18">
+            <p14:nvContentPartPr>
+              <p14:cNvPr id="20" name="Ink 19">
+                <a:extLst>
+                  <a:ext uri="{FF2B5EF4-FFF2-40B4-BE49-F238E27FC236}">
+                    <a16:creationId xmlns:a16="http://schemas.microsoft.com/office/drawing/2014/main" id="{CBC8C91C-BE72-4FEC-9DB8-DE267949D43E}"/>
+                  </a:ext>
+                </a:extLst>
+              </p14:cNvPr>
+              <p14:cNvContentPartPr/>
+              <p14:nvPr/>
+            </p14:nvContentPartPr>
+            <p14:xfrm>
+              <a:off x="10033740" y="4468950"/>
+              <a:ext cx="23400" cy="18360"/>
+            </p14:xfrm>
+          </p:contentPart>
+        </mc:Choice>
+        <mc:Fallback>
+          <p:pic>
+            <p:nvPicPr>
+              <p:cNvPr id="20" name="Ink 19">
+                <a:extLst>
+                  <a:ext uri="{FF2B5EF4-FFF2-40B4-BE49-F238E27FC236}">
+                    <a16:creationId xmlns:a16="http://schemas.microsoft.com/office/drawing/2014/main" id="{CBC8C91C-BE72-4FEC-9DB8-DE267949D43E}"/>
+                  </a:ext>
+                </a:extLst>
+              </p:cNvPr>
+              <p:cNvPicPr/>
+              <p:nvPr/>
+            </p:nvPicPr>
+            <p:blipFill>
+              <a:blip r:embed="rId19"/>
+              <a:stretch>
+                <a:fillRect/>
+              </a:stretch>
+            </p:blipFill>
+            <p:spPr>
+              <a:xfrm>
+                <a:off x="10024740" y="4460310"/>
+                <a:ext cx="41040" cy="36000"/>
+              </a:xfrm>
+              <a:prstGeom prst="rect">
+                <a:avLst/>
+              </a:prstGeom>
+            </p:spPr>
+          </p:pic>
+        </mc:Fallback>
+      </mc:AlternateContent>
+      <p:grpSp>
+        <p:nvGrpSpPr>
+          <p:cNvPr id="37" name="Group 36">
+            <a:extLst>
+              <a:ext uri="{FF2B5EF4-FFF2-40B4-BE49-F238E27FC236}">
+                <a16:creationId xmlns:a16="http://schemas.microsoft.com/office/drawing/2014/main" id="{5AADF6FA-59A1-4613-97CF-52A30A86F857}"/>
+              </a:ext>
+            </a:extLst>
+          </p:cNvPr>
+          <p:cNvGrpSpPr/>
+          <p:nvPr/>
+        </p:nvGrpSpPr>
+        <p:grpSpPr>
+          <a:xfrm>
+            <a:off x="10131458" y="2946382"/>
+            <a:ext cx="208800" cy="253800"/>
+            <a:chOff x="10131458" y="2946382"/>
+            <a:chExt cx="208800" cy="253800"/>
+          </a:xfrm>
+        </p:grpSpPr>
+        <mc:AlternateContent xmlns:mc="http://schemas.openxmlformats.org/markup-compatibility/2006">
+          <mc:Choice xmlns:p14="http://schemas.microsoft.com/office/powerpoint/2010/main" Requires="p14">
+            <p:contentPart p14:bwMode="auto" r:id="rId20">
+              <p14:nvContentPartPr>
+                <p14:cNvPr id="30" name="Ink 29">
+                  <a:extLst>
+                    <a:ext uri="{FF2B5EF4-FFF2-40B4-BE49-F238E27FC236}">
+                      <a16:creationId xmlns:a16="http://schemas.microsoft.com/office/drawing/2014/main" id="{B20B5D45-2074-46DB-AD55-EAAB7939BF47}"/>
+                    </a:ext>
+                  </a:extLst>
+                </p14:cNvPr>
+                <p14:cNvContentPartPr/>
+                <p14:nvPr/>
+              </p14:nvContentPartPr>
+              <p14:xfrm>
+                <a:off x="10215338" y="3086062"/>
+                <a:ext cx="93600" cy="114120"/>
+              </p14:xfrm>
+            </p:contentPart>
+          </mc:Choice>
+          <mc:Fallback>
+            <p:pic>
+              <p:nvPicPr>
+                <p:cNvPr id="30" name="Ink 29">
+                  <a:extLst>
+                    <a:ext uri="{FF2B5EF4-FFF2-40B4-BE49-F238E27FC236}">
+                      <a16:creationId xmlns:a16="http://schemas.microsoft.com/office/drawing/2014/main" id="{B20B5D45-2074-46DB-AD55-EAAB7939BF47}"/>
+                    </a:ext>
+                  </a:extLst>
+                </p:cNvPr>
+                <p:cNvPicPr/>
+                <p:nvPr/>
+              </p:nvPicPr>
+              <p:blipFill>
+                <a:blip r:embed="rId21"/>
+                <a:stretch>
+                  <a:fillRect/>
+                </a:stretch>
+              </p:blipFill>
+              <p:spPr>
+                <a:xfrm>
+                  <a:off x="10206338" y="3077422"/>
+                  <a:ext cx="111240" cy="131760"/>
+                </a:xfrm>
+                <a:prstGeom prst="rect">
+                  <a:avLst/>
+                </a:prstGeom>
+              </p:spPr>
+            </p:pic>
+          </mc:Fallback>
+        </mc:AlternateContent>
+        <mc:AlternateContent xmlns:mc="http://schemas.openxmlformats.org/markup-compatibility/2006">
+          <mc:Choice xmlns:p14="http://schemas.microsoft.com/office/powerpoint/2010/main" Requires="p14">
+            <p:contentPart p14:bwMode="auto" r:id="rId22">
+              <p14:nvContentPartPr>
+                <p14:cNvPr id="31" name="Ink 30">
+                  <a:extLst>
+                    <a:ext uri="{FF2B5EF4-FFF2-40B4-BE49-F238E27FC236}">
+                      <a16:creationId xmlns:a16="http://schemas.microsoft.com/office/drawing/2014/main" id="{4E134612-18DF-4F8A-AAA6-C0E88D1A144C}"/>
+                    </a:ext>
+                  </a:extLst>
+                </p14:cNvPr>
+                <p14:cNvContentPartPr/>
+                <p14:nvPr/>
+              </p14:nvContentPartPr>
+              <p14:xfrm>
+                <a:off x="10131458" y="2955382"/>
+                <a:ext cx="208800" cy="91440"/>
+              </p14:xfrm>
+            </p:contentPart>
+          </mc:Choice>
+          <mc:Fallback>
+            <p:pic>
+              <p:nvPicPr>
+                <p:cNvPr id="31" name="Ink 30">
+                  <a:extLst>
+                    <a:ext uri="{FF2B5EF4-FFF2-40B4-BE49-F238E27FC236}">
+                      <a16:creationId xmlns:a16="http://schemas.microsoft.com/office/drawing/2014/main" id="{4E134612-18DF-4F8A-AAA6-C0E88D1A144C}"/>
+                    </a:ext>
+                  </a:extLst>
+                </p:cNvPr>
+                <p:cNvPicPr/>
+                <p:nvPr/>
+              </p:nvPicPr>
+              <p:blipFill>
+                <a:blip r:embed="rId23"/>
+                <a:stretch>
+                  <a:fillRect/>
+                </a:stretch>
+              </p:blipFill>
+              <p:spPr>
+                <a:xfrm>
+                  <a:off x="10122818" y="2946742"/>
+                  <a:ext cx="226440" cy="109080"/>
+                </a:xfrm>
+                <a:prstGeom prst="rect">
+                  <a:avLst/>
+                </a:prstGeom>
+              </p:spPr>
+            </p:pic>
+          </mc:Fallback>
+        </mc:AlternateContent>
+        <mc:AlternateContent xmlns:mc="http://schemas.openxmlformats.org/markup-compatibility/2006">
+          <mc:Choice xmlns:p14="http://schemas.microsoft.com/office/powerpoint/2010/main" Requires="p14">
+            <p:contentPart p14:bwMode="auto" r:id="rId24">
+              <p14:nvContentPartPr>
+                <p14:cNvPr id="32" name="Ink 31">
+                  <a:extLst>
+                    <a:ext uri="{FF2B5EF4-FFF2-40B4-BE49-F238E27FC236}">
+                      <a16:creationId xmlns:a16="http://schemas.microsoft.com/office/drawing/2014/main" id="{581C1B53-504E-4216-800A-0E18997CFA57}"/>
+                    </a:ext>
+                  </a:extLst>
+                </p14:cNvPr>
+                <p14:cNvContentPartPr/>
+                <p14:nvPr/>
+              </p14:nvContentPartPr>
+              <p14:xfrm>
+                <a:off x="10246658" y="2946382"/>
+                <a:ext cx="84960" cy="123120"/>
+              </p14:xfrm>
+            </p:contentPart>
+          </mc:Choice>
+          <mc:Fallback>
+            <p:pic>
+              <p:nvPicPr>
+                <p:cNvPr id="32" name="Ink 31">
+                  <a:extLst>
+                    <a:ext uri="{FF2B5EF4-FFF2-40B4-BE49-F238E27FC236}">
+                      <a16:creationId xmlns:a16="http://schemas.microsoft.com/office/drawing/2014/main" id="{581C1B53-504E-4216-800A-0E18997CFA57}"/>
+                    </a:ext>
+                  </a:extLst>
+                </p:cNvPr>
+                <p:cNvPicPr/>
+                <p:nvPr/>
+              </p:nvPicPr>
+              <p:blipFill>
+                <a:blip r:embed="rId25"/>
+                <a:stretch>
+                  <a:fillRect/>
+                </a:stretch>
+              </p:blipFill>
+              <p:spPr>
+                <a:xfrm>
+                  <a:off x="10237658" y="2937742"/>
+                  <a:ext cx="102600" cy="140760"/>
+                </a:xfrm>
+                <a:prstGeom prst="rect">
+                  <a:avLst/>
+                </a:prstGeom>
+              </p:spPr>
+            </p:pic>
+          </mc:Fallback>
+        </mc:AlternateContent>
+      </p:grpSp>
+      <p:grpSp>
+        <p:nvGrpSpPr>
+          <p:cNvPr id="36" name="Group 35">
+            <a:extLst>
+              <a:ext uri="{FF2B5EF4-FFF2-40B4-BE49-F238E27FC236}">
+                <a16:creationId xmlns:a16="http://schemas.microsoft.com/office/drawing/2014/main" id="{2871BC6F-5E6E-46CD-B465-EB5E1CC38840}"/>
+              </a:ext>
+            </a:extLst>
+          </p:cNvPr>
+          <p:cNvGrpSpPr/>
+          <p:nvPr/>
+        </p:nvGrpSpPr>
+        <p:grpSpPr>
+          <a:xfrm>
+            <a:off x="10767578" y="2776822"/>
+            <a:ext cx="221400" cy="340200"/>
+            <a:chOff x="10767578" y="2776822"/>
+            <a:chExt cx="221400" cy="340200"/>
+          </a:xfrm>
+        </p:grpSpPr>
+        <mc:AlternateContent xmlns:mc="http://schemas.openxmlformats.org/markup-compatibility/2006">
+          <mc:Choice xmlns:p14="http://schemas.microsoft.com/office/powerpoint/2010/main" Requires="p14">
+            <p:contentPart p14:bwMode="auto" r:id="rId26">
+              <p14:nvContentPartPr>
+                <p14:cNvPr id="33" name="Ink 32">
+                  <a:extLst>
+                    <a:ext uri="{FF2B5EF4-FFF2-40B4-BE49-F238E27FC236}">
+                      <a16:creationId xmlns:a16="http://schemas.microsoft.com/office/drawing/2014/main" id="{0917C847-A511-4574-9FFC-25C8EDBF88FF}"/>
+                    </a:ext>
+                  </a:extLst>
+                </p14:cNvPr>
+                <p14:cNvContentPartPr/>
+                <p14:nvPr/>
+              </p14:nvContentPartPr>
+              <p14:xfrm>
+                <a:off x="10789898" y="2868622"/>
+                <a:ext cx="156240" cy="248400"/>
+              </p14:xfrm>
+            </p:contentPart>
+          </mc:Choice>
+          <mc:Fallback>
+            <p:pic>
+              <p:nvPicPr>
+                <p:cNvPr id="33" name="Ink 32">
+                  <a:extLst>
+                    <a:ext uri="{FF2B5EF4-FFF2-40B4-BE49-F238E27FC236}">
+                      <a16:creationId xmlns:a16="http://schemas.microsoft.com/office/drawing/2014/main" id="{0917C847-A511-4574-9FFC-25C8EDBF88FF}"/>
+                    </a:ext>
+                  </a:extLst>
+                </p:cNvPr>
+                <p:cNvPicPr/>
+                <p:nvPr/>
+              </p:nvPicPr>
+              <p:blipFill>
+                <a:blip r:embed="rId27"/>
+                <a:stretch>
+                  <a:fillRect/>
+                </a:stretch>
+              </p:blipFill>
+              <p:spPr>
+                <a:xfrm>
+                  <a:off x="10781258" y="2859622"/>
+                  <a:ext cx="173880" cy="266040"/>
+                </a:xfrm>
+                <a:prstGeom prst="rect">
+                  <a:avLst/>
+                </a:prstGeom>
+              </p:spPr>
+            </p:pic>
+          </mc:Fallback>
+        </mc:AlternateContent>
+        <mc:AlternateContent xmlns:mc="http://schemas.openxmlformats.org/markup-compatibility/2006">
+          <mc:Choice xmlns:p14="http://schemas.microsoft.com/office/powerpoint/2010/main" Requires="p14">
+            <p:contentPart p14:bwMode="auto" r:id="rId28">
+              <p14:nvContentPartPr>
+                <p14:cNvPr id="34" name="Ink 33">
+                  <a:extLst>
+                    <a:ext uri="{FF2B5EF4-FFF2-40B4-BE49-F238E27FC236}">
+                      <a16:creationId xmlns:a16="http://schemas.microsoft.com/office/drawing/2014/main" id="{48D5A544-769D-4B11-8BBF-A8BD20BADF87}"/>
+                    </a:ext>
+                  </a:extLst>
+                </p14:cNvPr>
+                <p14:cNvContentPartPr/>
+                <p14:nvPr/>
+              </p14:nvContentPartPr>
+              <p14:xfrm>
+                <a:off x="10767578" y="2776822"/>
+                <a:ext cx="221400" cy="96120"/>
+              </p14:xfrm>
+            </p:contentPart>
+          </mc:Choice>
+          <mc:Fallback>
+            <p:pic>
+              <p:nvPicPr>
+                <p:cNvPr id="34" name="Ink 33">
+                  <a:extLst>
+                    <a:ext uri="{FF2B5EF4-FFF2-40B4-BE49-F238E27FC236}">
+                      <a16:creationId xmlns:a16="http://schemas.microsoft.com/office/drawing/2014/main" id="{48D5A544-769D-4B11-8BBF-A8BD20BADF87}"/>
+                    </a:ext>
+                  </a:extLst>
+                </p:cNvPr>
+                <p:cNvPicPr/>
+                <p:nvPr/>
+              </p:nvPicPr>
+              <p:blipFill>
+                <a:blip r:embed="rId29"/>
+                <a:stretch>
+                  <a:fillRect/>
+                </a:stretch>
+              </p:blipFill>
+              <p:spPr>
+                <a:xfrm>
+                  <a:off x="10758938" y="2768182"/>
+                  <a:ext cx="239040" cy="113760"/>
+                </a:xfrm>
+                <a:prstGeom prst="rect">
+                  <a:avLst/>
+                </a:prstGeom>
+              </p:spPr>
+            </p:pic>
+          </mc:Fallback>
+        </mc:AlternateContent>
+        <mc:AlternateContent xmlns:mc="http://schemas.openxmlformats.org/markup-compatibility/2006">
+          <mc:Choice xmlns:p14="http://schemas.microsoft.com/office/powerpoint/2010/main" Requires="p14">
+            <p:contentPart p14:bwMode="auto" r:id="rId30">
+              <p14:nvContentPartPr>
+                <p14:cNvPr id="35" name="Ink 34">
+                  <a:extLst>
+                    <a:ext uri="{FF2B5EF4-FFF2-40B4-BE49-F238E27FC236}">
+                      <a16:creationId xmlns:a16="http://schemas.microsoft.com/office/drawing/2014/main" id="{7B73DE46-9356-46E8-9456-6AB4585B972A}"/>
+                    </a:ext>
+                  </a:extLst>
+                </p14:cNvPr>
+                <p14:cNvContentPartPr/>
+                <p14:nvPr/>
+              </p14:nvContentPartPr>
+              <p14:xfrm>
+                <a:off x="10897178" y="2781862"/>
+                <a:ext cx="80280" cy="179280"/>
+              </p14:xfrm>
+            </p:contentPart>
+          </mc:Choice>
+          <mc:Fallback>
+            <p:pic>
+              <p:nvPicPr>
+                <p:cNvPr id="35" name="Ink 34">
+                  <a:extLst>
+                    <a:ext uri="{FF2B5EF4-FFF2-40B4-BE49-F238E27FC236}">
+                      <a16:creationId xmlns:a16="http://schemas.microsoft.com/office/drawing/2014/main" id="{7B73DE46-9356-46E8-9456-6AB4585B972A}"/>
+                    </a:ext>
+                  </a:extLst>
+                </p:cNvPr>
+                <p:cNvPicPr/>
+                <p:nvPr/>
+              </p:nvPicPr>
+              <p:blipFill>
+                <a:blip r:embed="rId31"/>
+                <a:stretch>
+                  <a:fillRect/>
+                </a:stretch>
+              </p:blipFill>
+              <p:spPr>
+                <a:xfrm>
+                  <a:off x="10888538" y="2773222"/>
+                  <a:ext cx="97920" cy="196920"/>
                 </a:xfrm>
                 <a:prstGeom prst="rect">
                   <a:avLst/>

</xml_diff>